<commit_message>
Formatting differrences in multiple source files
</commit_message>
<xml_diff>
--- a/documentation/Forge.pptx
+++ b/documentation/Forge.pptx
@@ -5309,8 +5309,8 @@
         </p:nvSpPr>
         <p:spPr>
           <a:xfrm>
-            <a:off x="609600" y="3657600"/>
-            <a:ext cx="8229600" cy="762000"/>
+            <a:off x="609600" y="2895600"/>
+            <a:ext cx="8229600" cy="1524000"/>
           </a:xfrm>
           <a:prstGeom prst="rect">
             <a:avLst/>
@@ -5330,6 +5330,82 @@
             </a:sp3d>
           </a:bodyPr>
           <a:lstStyle/>
+          <a:p>
+            <a:pPr marL="0" marR="0" lvl="0" indent="0" algn="ctr" defTabSz="914400" rtl="0" eaLnBrk="1" fontAlgn="auto" latinLnBrk="0" hangingPunct="1">
+              <a:lnSpc>
+                <a:spcPct val="100000"/>
+              </a:lnSpc>
+              <a:spcBef>
+                <a:spcPct val="0"/>
+              </a:spcBef>
+              <a:spcAft>
+                <a:spcPts val="0"/>
+              </a:spcAft>
+              <a:buClrTx/>
+              <a:buSzTx/>
+              <a:buFontTx/>
+              <a:buNone/>
+              <a:tabLst/>
+              <a:defRPr/>
+            </a:pPr>
+            <a:endParaRPr lang="en" sz="2000" kern="1200" dirty="0" smtClean="0">
+              <a:solidFill>
+                <a:schemeClr val="bg1">
+                  <a:lumMod val="85000"/>
+                  <a:lumOff val="15000"/>
+                </a:schemeClr>
+              </a:solidFill>
+              <a:effectLst>
+                <a:outerShdw blurRad="38100" dist="25500" dir="5400000" algn="tl" rotWithShape="0">
+                  <a:srgbClr val="000000">
+                    <a:satMod val="180000"/>
+                    <a:alpha val="75000"/>
+                  </a:srgbClr>
+                </a:outerShdw>
+              </a:effectLst>
+              <a:latin typeface="+mj-lt"/>
+              <a:ea typeface="+mj-ea"/>
+              <a:cs typeface="+mj-cs"/>
+            </a:endParaRPr>
+          </a:p>
+          <a:p>
+            <a:pPr marL="0" marR="0" lvl="0" indent="0" algn="ctr" defTabSz="914400" rtl="0" eaLnBrk="1" fontAlgn="auto" latinLnBrk="0" hangingPunct="1">
+              <a:lnSpc>
+                <a:spcPct val="100000"/>
+              </a:lnSpc>
+              <a:spcBef>
+                <a:spcPct val="0"/>
+              </a:spcBef>
+              <a:spcAft>
+                <a:spcPts val="0"/>
+              </a:spcAft>
+              <a:buClrTx/>
+              <a:buSzTx/>
+              <a:buFontTx/>
+              <a:buNone/>
+              <a:tabLst/>
+              <a:defRPr/>
+            </a:pPr>
+            <a:endParaRPr lang="en" sz="2000" kern="1200" dirty="0" smtClean="0">
+              <a:solidFill>
+                <a:schemeClr val="bg1">
+                  <a:lumMod val="85000"/>
+                  <a:lumOff val="15000"/>
+                </a:schemeClr>
+              </a:solidFill>
+              <a:effectLst>
+                <a:outerShdw blurRad="38100" dist="25500" dir="5400000" algn="tl" rotWithShape="0">
+                  <a:srgbClr val="000000">
+                    <a:satMod val="180000"/>
+                    <a:alpha val="75000"/>
+                  </a:srgbClr>
+                </a:outerShdw>
+              </a:effectLst>
+              <a:latin typeface="+mj-lt"/>
+              <a:ea typeface="+mj-ea"/>
+              <a:cs typeface="+mj-cs"/>
+            </a:endParaRPr>
+          </a:p>
           <a:p>
             <a:pPr marL="0" marR="0" lvl="0" indent="0" algn="ctr" defTabSz="914400" rtl="0" eaLnBrk="1" fontAlgn="auto" latinLnBrk="0" hangingPunct="1">
               <a:lnSpc>
@@ -5368,7 +5444,29 @@
                 <a:ea typeface="+mj-ea"/>
                 <a:cs typeface="+mj-cs"/>
               </a:rPr>
-              <a:t>Developers:</a:t>
+              <a:t>Developers</a:t>
+            </a:r>
+            <a:r>
+              <a:rPr lang="en" sz="2000" kern="1200" dirty="0" smtClean="0">
+                <a:solidFill>
+                  <a:schemeClr val="bg1">
+                    <a:lumMod val="85000"/>
+                    <a:lumOff val="15000"/>
+                  </a:schemeClr>
+                </a:solidFill>
+                <a:effectLst>
+                  <a:outerShdw blurRad="38100" dist="25500" dir="5400000" algn="tl" rotWithShape="0">
+                    <a:srgbClr val="000000">
+                      <a:satMod val="180000"/>
+                      <a:alpha val="75000"/>
+                    </a:srgbClr>
+                  </a:outerShdw>
+                </a:effectLst>
+                <a:latin typeface="+mj-lt"/>
+                <a:ea typeface="+mj-ea"/>
+                <a:cs typeface="+mj-cs"/>
+              </a:rPr>
+              <a:t>:</a:t>
             </a:r>
           </a:p>
           <a:p>
@@ -5454,8 +5552,48 @@
                 <a:ea typeface="+mj-ea"/>
                 <a:cs typeface="+mj-cs"/>
               </a:rPr>
-              <a:t> Thompson,  </a:t>
-            </a:r>
+              <a:t> Thompson, </a:t>
+            </a:r>
+            <a:endParaRPr kumimoji="0" lang="en" sz="2000" b="0" i="0" u="none" strike="noStrike" kern="1200" cap="none" spc="0" normalizeH="0" noProof="0" dirty="0" smtClean="0">
+              <a:ln>
+                <a:noFill/>
+              </a:ln>
+              <a:solidFill>
+                <a:srgbClr val="FFCF1D"/>
+              </a:solidFill>
+              <a:effectLst>
+                <a:outerShdw blurRad="38100" dist="25500" dir="5400000" algn="tl" rotWithShape="0">
+                  <a:srgbClr val="000000">
+                    <a:satMod val="180000"/>
+                    <a:alpha val="75000"/>
+                  </a:srgbClr>
+                </a:outerShdw>
+              </a:effectLst>
+              <a:uLnTx/>
+              <a:uFillTx/>
+              <a:latin typeface="+mj-lt"/>
+              <a:ea typeface="+mj-ea"/>
+              <a:cs typeface="+mj-cs"/>
+            </a:endParaRPr>
+          </a:p>
+          <a:p>
+            <a:pPr marL="0" marR="0" lvl="0" indent="0" algn="ctr" defTabSz="914400" rtl="0" eaLnBrk="1" fontAlgn="auto" latinLnBrk="0" hangingPunct="1">
+              <a:lnSpc>
+                <a:spcPct val="100000"/>
+              </a:lnSpc>
+              <a:spcBef>
+                <a:spcPct val="0"/>
+              </a:spcBef>
+              <a:spcAft>
+                <a:spcPts val="0"/>
+              </a:spcAft>
+              <a:buClrTx/>
+              <a:buSzTx/>
+              <a:buFontTx/>
+              <a:buNone/>
+              <a:tabLst/>
+              <a:defRPr/>
+            </a:pPr>
             <a:r>
               <a:rPr lang="en" sz="2000" kern="1200" baseline="0" dirty="0" smtClean="0">
                 <a:solidFill>
@@ -5492,7 +5630,26 @@
                 <a:ea typeface="+mj-ea"/>
                 <a:cs typeface="+mj-cs"/>
               </a:rPr>
-              <a:t> Wood,  </a:t>
+              <a:t> </a:t>
+            </a:r>
+            <a:r>
+              <a:rPr lang="en" sz="2000" kern="1200" dirty="0" smtClean="0">
+                <a:solidFill>
+                  <a:srgbClr val="FFCF1D"/>
+                </a:solidFill>
+                <a:effectLst>
+                  <a:outerShdw blurRad="38100" dist="25500" dir="5400000" algn="tl" rotWithShape="0">
+                    <a:srgbClr val="000000">
+                      <a:satMod val="180000"/>
+                      <a:alpha val="75000"/>
+                    </a:srgbClr>
+                  </a:outerShdw>
+                </a:effectLst>
+                <a:latin typeface="+mj-lt"/>
+                <a:ea typeface="+mj-ea"/>
+                <a:cs typeface="+mj-cs"/>
+              </a:rPr>
+              <a:t>Wood,  </a:t>
             </a:r>
             <a:r>
               <a:rPr kumimoji="0" lang="en" sz="2000" b="0" i="0" u="none" strike="noStrike" kern="1200" cap="none" spc="0" normalizeH="0" baseline="0" noProof="0" dirty="0" smtClean="0">
@@ -5519,6 +5676,25 @@
               <a:t>James</a:t>
             </a:r>
             <a:r>
+              <a:rPr lang="en" sz="2000" kern="1200" dirty="0" smtClean="0">
+                <a:solidFill>
+                  <a:srgbClr val="FFCF1D"/>
+                </a:solidFill>
+                <a:effectLst>
+                  <a:outerShdw blurRad="38100" dist="25500" dir="5400000" algn="tl" rotWithShape="0">
+                    <a:srgbClr val="000000">
+                      <a:satMod val="180000"/>
+                      <a:alpha val="75000"/>
+                    </a:srgbClr>
+                  </a:outerShdw>
+                </a:effectLst>
+                <a:latin typeface="+mj-lt"/>
+                <a:ea typeface="+mj-ea"/>
+                <a:cs typeface="+mj-cs"/>
+              </a:rPr>
+              <a:t> Foster</a:t>
+            </a:r>
+            <a:r>
               <a:rPr kumimoji="0" lang="en" sz="2000" b="0" i="0" u="none" strike="noStrike" kern="1200" cap="none" spc="0" normalizeH="0" noProof="0" dirty="0" smtClean="0">
                 <a:ln>
                   <a:noFill/>
@@ -5540,8 +5716,27 @@
                 <a:ea typeface="+mj-ea"/>
                 <a:cs typeface="+mj-cs"/>
               </a:rPr>
-              <a:t> ???,  </a:t>
-            </a:r>
+              <a:t>, </a:t>
+            </a:r>
+          </a:p>
+          <a:p>
+            <a:pPr marL="0" marR="0" lvl="0" indent="0" algn="ctr" defTabSz="914400" rtl="0" eaLnBrk="1" fontAlgn="auto" latinLnBrk="0" hangingPunct="1">
+              <a:lnSpc>
+                <a:spcPct val="100000"/>
+              </a:lnSpc>
+              <a:spcBef>
+                <a:spcPct val="0"/>
+              </a:spcBef>
+              <a:spcAft>
+                <a:spcPts val="0"/>
+              </a:spcAft>
+              <a:buClrTx/>
+              <a:buSzTx/>
+              <a:buFontTx/>
+              <a:buNone/>
+              <a:tabLst/>
+              <a:defRPr/>
+            </a:pPr>
             <a:r>
               <a:rPr lang="en" sz="2000" kern="1200" baseline="0" dirty="0" smtClean="0">
                 <a:solidFill>
@@ -5559,27 +5754,8 @@
                 <a:ea typeface="+mj-ea"/>
                 <a:cs typeface="+mj-cs"/>
               </a:rPr>
-              <a:t>DJ</a:t>
-            </a:r>
-          </a:p>
-          <a:p>
-            <a:pPr marL="0" marR="0" lvl="0" indent="0" algn="ctr" defTabSz="914400" rtl="0" eaLnBrk="1" fontAlgn="auto" latinLnBrk="0" hangingPunct="1">
-              <a:lnSpc>
-                <a:spcPct val="100000"/>
-              </a:lnSpc>
-              <a:spcBef>
-                <a:spcPct val="0"/>
-              </a:spcBef>
-              <a:spcAft>
-                <a:spcPts val="0"/>
-              </a:spcAft>
-              <a:buClrTx/>
-              <a:buSzTx/>
-              <a:buFontTx/>
-              <a:buNone/>
-              <a:tabLst/>
-              <a:defRPr/>
-            </a:pPr>
+              <a:t>DJ Scott, Melissa Morel</a:t>
+            </a:r>
             <a:endParaRPr lang="en" sz="2000" kern="1200" baseline="0" dirty="0" smtClean="0">
               <a:solidFill>
                 <a:srgbClr val="FFCF1D"/>
@@ -5637,7 +5813,31 @@
                 <a:ea typeface="+mj-ea"/>
                 <a:cs typeface="+mj-cs"/>
               </a:rPr>
-              <a:t>CS370, Professor Ledin</a:t>
+              <a:t>CS370</a:t>
+            </a:r>
+            <a:r>
+              <a:rPr kumimoji="0" lang="en" sz="2000" b="0" i="0" u="none" strike="noStrike" kern="1200" cap="none" spc="0" normalizeH="0" noProof="0" dirty="0" smtClean="0">
+                <a:ln>
+                  <a:noFill/>
+                </a:ln>
+                <a:solidFill>
+                  <a:srgbClr val="FF0000"/>
+                </a:solidFill>
+                <a:effectLst>
+                  <a:outerShdw blurRad="38100" dist="25500" dir="5400000" algn="tl" rotWithShape="0">
+                    <a:srgbClr val="000000">
+                      <a:satMod val="180000"/>
+                      <a:alpha val="75000"/>
+                    </a:srgbClr>
+                  </a:outerShdw>
+                </a:effectLst>
+                <a:uLnTx/>
+                <a:uFillTx/>
+                <a:latin typeface="+mj-lt"/>
+                <a:ea typeface="+mj-ea"/>
+                <a:cs typeface="+mj-cs"/>
+              </a:rPr>
+              <a:t>, Professor Ledin</a:t>
             </a:r>
             <a:endParaRPr kumimoji="0" lang="en" sz="2000" b="0" i="0" u="none" strike="noStrike" kern="1200" cap="none" spc="0" normalizeH="0" baseline="0" noProof="0" dirty="0">
               <a:ln>
@@ -6607,15 +6807,7 @@
             </a:pPr>
             <a:r>
               <a:rPr lang="en" dirty="0" smtClean="0"/>
-              <a:t>Forge will boast a slick and easy to use interface that will allow anyone, no matter </a:t>
-            </a:r>
-            <a:r>
-              <a:rPr lang="en" dirty="0" smtClean="0"/>
-              <a:t>their </a:t>
-            </a:r>
-            <a:r>
-              <a:rPr lang="en" dirty="0" smtClean="0"/>
-              <a:t>major, to enjoy the benifits of Forge.</a:t>
+              <a:t>Forge will boast a slick and easy to use interface that will allow anyone, no matter their major, to enjoy the benifits of Forge.</a:t>
             </a:r>
           </a:p>
         </p:txBody>
@@ -6685,11 +6877,7 @@
             </a:pPr>
             <a:r>
               <a:rPr lang="en" dirty="0" smtClean="0"/>
-              <a:t>Forge: </a:t>
-            </a:r>
-            <a:r>
-              <a:rPr lang="en" dirty="0" smtClean="0"/>
-              <a:t>Features</a:t>
+              <a:t>Forge: Features</a:t>
             </a:r>
             <a:endParaRPr lang="en" dirty="0"/>
           </a:p>
@@ -6749,11 +6937,7 @@
             </a:pPr>
             <a:r>
               <a:rPr lang="en" dirty="0" smtClean="0"/>
-              <a:t>	</a:t>
-            </a:r>
-            <a:r>
-              <a:rPr lang="en" dirty="0" smtClean="0"/>
-              <a:t>- Based on availability</a:t>
+              <a:t>	- Based on availability</a:t>
             </a:r>
           </a:p>
           <a:p>
@@ -6777,11 +6961,16 @@
             </a:pPr>
             <a:r>
               <a:rPr lang="en" dirty="0" smtClean="0"/>
-              <a:t>	</a:t>
-            </a:r>
+              <a:t>	-Android</a:t>
+            </a:r>
+          </a:p>
+          <a:p>
+            <a:pPr>
+              <a:buNone/>
+            </a:pPr>
             <a:r>
               <a:rPr lang="en" dirty="0" smtClean="0"/>
-              <a:t>-Android</a:t>
+              <a:t>	-iOS(*)</a:t>
             </a:r>
           </a:p>
           <a:p>
@@ -6790,26 +6979,8 @@
             </a:pPr>
             <a:r>
               <a:rPr lang="en" dirty="0" smtClean="0"/>
-              <a:t>	</a:t>
-            </a:r>
-            <a:r>
-              <a:rPr lang="en" dirty="0" smtClean="0"/>
-              <a:t>-iOS(*)</a:t>
-            </a:r>
-          </a:p>
-          <a:p>
-            <a:pPr>
-              <a:buNone/>
-            </a:pPr>
-            <a:r>
-              <a:rPr lang="en" dirty="0" smtClean="0"/>
-              <a:t>	</a:t>
-            </a:r>
-            <a:r>
-              <a:rPr lang="en" dirty="0" smtClean="0"/>
-              <a:t>-Web</a:t>
-            </a:r>
-            <a:endParaRPr lang="en" dirty="0" smtClean="0"/>
+              <a:t>	-Web</a:t>
+            </a:r>
           </a:p>
         </p:txBody>
       </p:sp>
@@ -7030,7 +7201,6 @@
               <a:rPr lang="en" dirty="0" smtClean="0"/>
               <a:t>This concept will be realized through attempting to keep the on-screen keyboard hidden for most of the tasks.</a:t>
             </a:r>
-            <a:endParaRPr lang="en" dirty="0" smtClean="0"/>
           </a:p>
         </p:txBody>
       </p:sp>
@@ -7187,7 +7357,6 @@
               <a:rPr lang="en" sz="2800" dirty="0" smtClean="0"/>
               <a:t>Fun!</a:t>
             </a:r>
-            <a:endParaRPr lang="en" sz="2800" dirty="0" smtClean="0"/>
           </a:p>
         </p:txBody>
       </p:sp>
@@ -7296,7 +7465,6 @@
               <a:rPr lang="en" sz="2800" dirty="0" smtClean="0"/>
               <a:t>This will be the core feature of the Forge.</a:t>
             </a:r>
-            <a:endParaRPr lang="en" sz="2800" dirty="0" smtClean="0"/>
           </a:p>
         </p:txBody>
       </p:sp>
@@ -7475,24 +7643,16 @@
             </a:pPr>
             <a:r>
               <a:rPr lang="en" sz="2800" dirty="0" smtClean="0"/>
-              <a:t>	</a:t>
-            </a:r>
+              <a:t>	- Android Client</a:t>
+            </a:r>
+          </a:p>
+          <a:p>
+            <a:pPr>
+              <a:buNone/>
+            </a:pPr>
             <a:r>
               <a:rPr lang="en" sz="2800" dirty="0" smtClean="0"/>
-              <a:t>- Android Client</a:t>
-            </a:r>
-          </a:p>
-          <a:p>
-            <a:pPr>
-              <a:buNone/>
-            </a:pPr>
-            <a:r>
-              <a:rPr lang="en" sz="2800" dirty="0" smtClean="0"/>
-              <a:t>	</a:t>
-            </a:r>
-            <a:r>
-              <a:rPr lang="en" sz="2800" dirty="0" smtClean="0"/>
-              <a:t>- Web Client</a:t>
+              <a:t>	- Web Client</a:t>
             </a:r>
           </a:p>
           <a:p>
@@ -7821,11 +7981,7 @@
             </a:pPr>
             <a:r>
               <a:rPr lang="en" sz="2800" dirty="0" smtClean="0"/>
-              <a:t>Dynamic Map of </a:t>
-            </a:r>
-            <a:r>
-              <a:rPr lang="en" sz="2800" dirty="0" smtClean="0"/>
-              <a:t>Campus</a:t>
+              <a:t>Dynamic Map of Campus</a:t>
             </a:r>
           </a:p>
           <a:p>

</xml_diff>